<commit_message>
changed presentation little bit
</commit_message>
<xml_diff>
--- a/thesisPresentation/Thesis - Updated.pptx
+++ b/thesisPresentation/Thesis - Updated.pptx
@@ -235,16 +235,16 @@
               <c:strCache>
                 <c:ptCount val="4"/>
                 <c:pt idx="0">
-                  <c:v>Retail vs Average</c:v>
+                  <c:v>Retail Prive vs Average Retail Price</c:v>
                 </c:pt>
                 <c:pt idx="1">
-                  <c:v>Retail vs Arrival</c:v>
+                  <c:v>Retail Price vs Arrival</c:v>
                 </c:pt>
                 <c:pt idx="2">
-                  <c:v>Retail vs Wholesale</c:v>
+                  <c:v>Retail Price vs Wholesale Price</c:v>
                 </c:pt>
                 <c:pt idx="3">
-                  <c:v>Wholesale vs Arrival</c:v>
+                  <c:v>Wholesale Price vs Arrival</c:v>
                 </c:pt>
               </c:strCache>
             </c:strRef>
@@ -282,11 +282,11 @@
         </c:dLbls>
         <c:marker val="1"/>
         <c:smooth val="0"/>
-        <c:axId val="-1052368544"/>
-        <c:axId val="-1052368000"/>
+        <c:axId val="22886592"/>
+        <c:axId val="22882240"/>
       </c:lineChart>
       <c:catAx>
-        <c:axId val="-1052368544"/>
+        <c:axId val="22886592"/>
         <c:scaling>
           <c:orientation val="minMax"/>
         </c:scaling>
@@ -329,7 +329,7 @@
             <a:endParaRPr lang="en-US"/>
           </a:p>
         </c:txPr>
-        <c:crossAx val="-1052368000"/>
+        <c:crossAx val="22882240"/>
         <c:crosses val="autoZero"/>
         <c:auto val="1"/>
         <c:lblAlgn val="ctr"/>
@@ -337,7 +337,7 @@
         <c:noMultiLvlLbl val="0"/>
       </c:catAx>
       <c:valAx>
-        <c:axId val="-1052368000"/>
+        <c:axId val="22882240"/>
         <c:scaling>
           <c:orientation val="minMax"/>
         </c:scaling>
@@ -388,7 +388,7 @@
             <a:endParaRPr lang="en-US"/>
           </a:p>
         </c:txPr>
-        <c:crossAx val="-1052368544"/>
+        <c:crossAx val="22886592"/>
         <c:crosses val="autoZero"/>
         <c:crossBetween val="between"/>
       </c:valAx>
@@ -582,101 +582,32 @@
               <a:effectLst/>
             </c:spPr>
           </c:marker>
-          <c:dLbls>
-            <c:dLbl>
-              <c:idx val="4"/>
-              <c:dLblPos val="r"/>
-              <c:showLegendKey val="0"/>
-              <c:showVal val="1"/>
-              <c:showCatName val="0"/>
-              <c:showSerName val="1"/>
-              <c:showPercent val="0"/>
-              <c:showBubbleSize val="0"/>
-              <c:extLst>
-                <c:ext xmlns:c15="http://schemas.microsoft.com/office/drawing/2012/chart" uri="{CE6537A1-D6FC-4f65-9D91-7224C49458BB}"/>
-              </c:extLst>
-            </c:dLbl>
-            <c:spPr>
-              <a:noFill/>
-              <a:ln>
-                <a:noFill/>
-              </a:ln>
-              <a:effectLst/>
-            </c:spPr>
-            <c:txPr>
-              <a:bodyPr rot="0" spcFirstLastPara="1" vertOverflow="ellipsis" vert="horz" wrap="square" lIns="38100" tIns="19050" rIns="38100" bIns="19050" anchor="ctr" anchorCtr="1">
-                <a:spAutoFit/>
-              </a:bodyPr>
-              <a:lstStyle/>
-              <a:p>
-                <a:pPr>
-                  <a:defRPr sz="1197" b="0" i="0" u="none" strike="noStrike" kern="1200" baseline="0">
-                    <a:solidFill>
-                      <a:schemeClr val="tx1">
-                        <a:lumMod val="75000"/>
-                        <a:lumOff val="25000"/>
-                      </a:schemeClr>
-                    </a:solidFill>
-                    <a:latin typeface="+mn-lt"/>
-                    <a:ea typeface="+mn-ea"/>
-                    <a:cs typeface="+mn-cs"/>
-                  </a:defRPr>
-                </a:pPr>
-                <a:endParaRPr lang="en-US"/>
-              </a:p>
-            </c:txPr>
-            <c:showLegendKey val="0"/>
-            <c:showVal val="0"/>
-            <c:showCatName val="0"/>
-            <c:showSerName val="0"/>
-            <c:showPercent val="0"/>
-            <c:showBubbleSize val="0"/>
-            <c:extLst>
-              <c:ext xmlns:c15="http://schemas.microsoft.com/office/drawing/2012/chart" uri="{CE6537A1-D6FC-4f65-9D91-7224C49458BB}">
-                <c15:showLeaderLines val="1"/>
-                <c15:leaderLines>
-                  <c:spPr>
-                    <a:ln w="9525" cap="flat" cmpd="sng" algn="ctr">
-                      <a:solidFill>
-                        <a:schemeClr val="tx1">
-                          <a:lumMod val="35000"/>
-                          <a:lumOff val="65000"/>
-                        </a:schemeClr>
-                      </a:solidFill>
-                      <a:round/>
-                    </a:ln>
-                    <a:effectLst/>
-                  </c:spPr>
-                </c15:leaderLines>
-              </c:ext>
-            </c:extLst>
-          </c:dLbls>
           <c:cat>
             <c:strRef>
-              <c:f>Sheet1!$A$2:$A$6</c:f>
+              <c:f>Sheet1!$A$2:$A$5</c:f>
               <c:strCache>
                 <c:ptCount val="4"/>
                 <c:pt idx="0">
-                  <c:v>Retail vs Average</c:v>
+                  <c:v>Retail Prive vs Average Retail Price</c:v>
                 </c:pt>
                 <c:pt idx="1">
-                  <c:v>Retail vs Arrival</c:v>
+                  <c:v>Retail Price vs Arrival</c:v>
                 </c:pt>
                 <c:pt idx="2">
-                  <c:v>Retail vs Wholesale</c:v>
+                  <c:v>Retail Price vs Wholesale Price</c:v>
                 </c:pt>
                 <c:pt idx="3">
-                  <c:v>Wholesale vs Arrival</c:v>
+                  <c:v>Wholesale Price vs Arrival</c:v>
                 </c:pt>
               </c:strCache>
             </c:strRef>
           </c:cat>
           <c:val>
             <c:numRef>
-              <c:f>Sheet1!$B$2:$B$6</c:f>
+              <c:f>Sheet1!$B$2:$B$5</c:f>
               <c:numCache>
                 <c:formatCode>General</c:formatCode>
-                <c:ptCount val="5"/>
+                <c:ptCount val="4"/>
                 <c:pt idx="0">
                   <c:v>24.49</c:v>
                 </c:pt>
@@ -704,11 +635,11 @@
         </c:dLbls>
         <c:marker val="1"/>
         <c:smooth val="0"/>
-        <c:axId val="-1045383856"/>
-        <c:axId val="-1045382768"/>
+        <c:axId val="22881152"/>
+        <c:axId val="22871360"/>
       </c:lineChart>
       <c:catAx>
-        <c:axId val="-1045383856"/>
+        <c:axId val="22881152"/>
         <c:scaling>
           <c:orientation val="minMax"/>
         </c:scaling>
@@ -751,7 +682,7 @@
             <a:endParaRPr lang="en-US"/>
           </a:p>
         </c:txPr>
-        <c:crossAx val="-1045382768"/>
+        <c:crossAx val="22871360"/>
         <c:crosses val="autoZero"/>
         <c:auto val="1"/>
         <c:lblAlgn val="ctr"/>
@@ -759,7 +690,7 @@
         <c:noMultiLvlLbl val="0"/>
       </c:catAx>
       <c:valAx>
-        <c:axId val="-1045382768"/>
+        <c:axId val="22871360"/>
         <c:scaling>
           <c:orientation val="minMax"/>
           <c:max val="50"/>
@@ -869,7 +800,7 @@
             <a:endParaRPr lang="en-US"/>
           </a:p>
         </c:txPr>
-        <c:crossAx val="-1045383856"/>
+        <c:crossAx val="22881152"/>
         <c:crosses val="autoZero"/>
         <c:crossBetween val="between"/>
       </c:valAx>
@@ -2076,7 +2007,7 @@
           <a:p>
             <a:fld id="{390D5725-AFFE-4E56-89F4-AFE2BF45C137}" type="datetimeFigureOut">
               <a:rPr lang="en-US"/>
-              <a:t>6/28/2016</a:t>
+              <a:t>6/29/2016</a:t>
             </a:fld>
             <a:endParaRPr lang="en-US"/>
           </a:p>
@@ -2640,7 +2571,7 @@
           <a:p>
             <a:fld id="{F1FA7AC5-6045-4418-8E60-F48788734473}" type="datetimeFigureOut">
               <a:rPr lang="en-US" smtClean="0"/>
-              <a:t>6/28/2016</a:t>
+              <a:t>6/29/2016</a:t>
             </a:fld>
             <a:endParaRPr lang="en-US"/>
           </a:p>
@@ -2808,7 +2739,7 @@
           <a:p>
             <a:fld id="{F1FA7AC5-6045-4418-8E60-F48788734473}" type="datetimeFigureOut">
               <a:rPr lang="en-US" smtClean="0"/>
-              <a:t>6/28/2016</a:t>
+              <a:t>6/29/2016</a:t>
             </a:fld>
             <a:endParaRPr lang="en-US"/>
           </a:p>
@@ -2986,7 +2917,7 @@
           <a:p>
             <a:fld id="{F1FA7AC5-6045-4418-8E60-F48788734473}" type="datetimeFigureOut">
               <a:rPr lang="en-US" smtClean="0"/>
-              <a:t>6/28/2016</a:t>
+              <a:t>6/29/2016</a:t>
             </a:fld>
             <a:endParaRPr lang="en-US"/>
           </a:p>
@@ -3154,7 +3085,7 @@
           <a:p>
             <a:fld id="{F1FA7AC5-6045-4418-8E60-F48788734473}" type="datetimeFigureOut">
               <a:rPr lang="en-US" smtClean="0"/>
-              <a:t>6/28/2016</a:t>
+              <a:t>6/29/2016</a:t>
             </a:fld>
             <a:endParaRPr lang="en-US"/>
           </a:p>
@@ -3399,7 +3330,7 @@
           <a:p>
             <a:fld id="{F1FA7AC5-6045-4418-8E60-F48788734473}" type="datetimeFigureOut">
               <a:rPr lang="en-US" smtClean="0"/>
-              <a:t>6/28/2016</a:t>
+              <a:t>6/29/2016</a:t>
             </a:fld>
             <a:endParaRPr lang="en-US"/>
           </a:p>
@@ -3628,7 +3559,7 @@
           <a:p>
             <a:fld id="{F1FA7AC5-6045-4418-8E60-F48788734473}" type="datetimeFigureOut">
               <a:rPr lang="en-US" smtClean="0"/>
-              <a:t>6/28/2016</a:t>
+              <a:t>6/29/2016</a:t>
             </a:fld>
             <a:endParaRPr lang="en-US"/>
           </a:p>
@@ -3992,7 +3923,7 @@
           <a:p>
             <a:fld id="{F1FA7AC5-6045-4418-8E60-F48788734473}" type="datetimeFigureOut">
               <a:rPr lang="en-US" smtClean="0"/>
-              <a:t>6/28/2016</a:t>
+              <a:t>6/29/2016</a:t>
             </a:fld>
             <a:endParaRPr lang="en-US"/>
           </a:p>
@@ -4109,7 +4040,7 @@
           <a:p>
             <a:fld id="{F1FA7AC5-6045-4418-8E60-F48788734473}" type="datetimeFigureOut">
               <a:rPr lang="en-US" smtClean="0"/>
-              <a:t>6/28/2016</a:t>
+              <a:t>6/29/2016</a:t>
             </a:fld>
             <a:endParaRPr lang="en-US"/>
           </a:p>
@@ -4204,7 +4135,7 @@
           <a:p>
             <a:fld id="{F1FA7AC5-6045-4418-8E60-F48788734473}" type="datetimeFigureOut">
               <a:rPr lang="en-US" smtClean="0"/>
-              <a:t>6/28/2016</a:t>
+              <a:t>6/29/2016</a:t>
             </a:fld>
             <a:endParaRPr lang="en-US"/>
           </a:p>
@@ -4479,7 +4410,7 @@
           <a:p>
             <a:fld id="{F1FA7AC5-6045-4418-8E60-F48788734473}" type="datetimeFigureOut">
               <a:rPr lang="en-US" smtClean="0"/>
-              <a:t>6/28/2016</a:t>
+              <a:t>6/29/2016</a:t>
             </a:fld>
             <a:endParaRPr lang="en-US"/>
           </a:p>
@@ -4731,7 +4662,7 @@
           <a:p>
             <a:fld id="{F1FA7AC5-6045-4418-8E60-F48788734473}" type="datetimeFigureOut">
               <a:rPr lang="en-US" smtClean="0"/>
-              <a:t>6/28/2016</a:t>
+              <a:t>6/29/2016</a:t>
             </a:fld>
             <a:endParaRPr lang="en-US"/>
           </a:p>
@@ -4942,7 +4873,7 @@
           <a:p>
             <a:fld id="{F1FA7AC5-6045-4418-8E60-F48788734473}" type="datetimeFigureOut">
               <a:rPr lang="en-US" smtClean="0"/>
-              <a:t>6/28/2016</a:t>
+              <a:t>6/29/2016</a:t>
             </a:fld>
             <a:endParaRPr lang="en-US"/>
           </a:p>
@@ -5567,7 +5498,7 @@
         <p:spPr>
           <a:xfrm>
             <a:off x="8937938" y="1893194"/>
-            <a:ext cx="2640169" cy="3693319"/>
+            <a:ext cx="2640169" cy="3970318"/>
           </a:xfrm>
           <a:prstGeom prst="rect">
             <a:avLst/>
@@ -5588,8 +5519,17 @@
           <a:p>
             <a:r>
               <a:rPr lang="en-IN" dirty="0" smtClean="0"/>
-              <a:t>Retail vs Average Retail:</a:t>
-            </a:r>
+              <a:t>Retail Price </a:t>
+            </a:r>
+            <a:r>
+              <a:rPr lang="en-IN" dirty="0" smtClean="0"/>
+              <a:t>vs Average </a:t>
+            </a:r>
+            <a:r>
+              <a:rPr lang="en-IN" dirty="0" smtClean="0"/>
+              <a:t>Retail Price:</a:t>
+            </a:r>
+            <a:endParaRPr lang="en-IN" dirty="0" smtClean="0"/>
           </a:p>
           <a:p>
             <a:pPr marL="285750" indent="-285750">
@@ -5895,7 +5835,7 @@
         <p:spPr>
           <a:xfrm>
             <a:off x="4096555" y="843240"/>
-            <a:ext cx="5439502" cy="369332"/>
+            <a:ext cx="6475042" cy="369332"/>
           </a:xfrm>
           <a:prstGeom prst="rect">
             <a:avLst/>
@@ -5910,7 +5850,23 @@
           <a:p>
             <a:r>
               <a:rPr lang="en-IN" dirty="0" smtClean="0"/>
-              <a:t>Mumbai – August 2013, Retail vs Average Retail Analysis</a:t>
+              <a:t>Mumbai – August 2013, </a:t>
+            </a:r>
+            <a:r>
+              <a:rPr lang="en-IN" dirty="0" smtClean="0"/>
+              <a:t>Retail Price </a:t>
+            </a:r>
+            <a:r>
+              <a:rPr lang="en-IN" dirty="0" smtClean="0"/>
+              <a:t>vs Average </a:t>
+            </a:r>
+            <a:r>
+              <a:rPr lang="en-IN" dirty="0" smtClean="0"/>
+              <a:t>Retail Price </a:t>
+            </a:r>
+            <a:r>
+              <a:rPr lang="en-IN" dirty="0" smtClean="0"/>
+              <a:t>Analysis</a:t>
             </a:r>
             <a:endParaRPr lang="en-IN" dirty="0"/>
           </a:p>
@@ -6657,7 +6613,6 @@
               <a:rPr lang="en-IN" dirty="0"/>
               <a:t>Union(GB , MV)</a:t>
             </a:r>
-            <a:endParaRPr lang="en-IN" dirty="0"/>
           </a:p>
         </p:txBody>
       </p:sp>
@@ -6688,7 +6643,6 @@
               <a:rPr lang="en-IN" dirty="0"/>
               <a:t>Union(WC , LR , SB)</a:t>
             </a:r>
-            <a:endParaRPr lang="en-IN" dirty="0"/>
           </a:p>
         </p:txBody>
       </p:sp>
@@ -6766,7 +6720,7 @@
           <p:nvPr>
             <p:extLst>
               <p:ext uri="{D42A27DB-BD31-4B8C-83A1-F6EECF244321}">
-                <p14:modId xmlns:p14="http://schemas.microsoft.com/office/powerpoint/2010/main" val="3334451603"/>
+                <p14:modId xmlns:p14="http://schemas.microsoft.com/office/powerpoint/2010/main" val="3204105210"/>
               </p:ext>
             </p:extLst>
           </p:nvPr>
@@ -6811,11 +6765,16 @@
           </p:cNvGraphicFramePr>
           <p:nvPr>
             <p:ph idx="1"/>
+            <p:extLst>
+              <p:ext uri="{D42A27DB-BD31-4B8C-83A1-F6EECF244321}">
+                <p14:modId xmlns:p14="http://schemas.microsoft.com/office/powerpoint/2010/main" val="3422959448"/>
+              </p:ext>
+            </p:extLst>
           </p:nvPr>
         </p:nvGraphicFramePr>
         <p:xfrm>
           <a:off x="838200" y="1825625"/>
-          <a:ext cx="5257800" cy="2931160"/>
+          <a:ext cx="5257800" cy="3474720"/>
         </p:xfrm>
         <a:graphic>
           <a:graphicData uri="http://schemas.openxmlformats.org/drawingml/2006/table">
@@ -6894,7 +6853,15 @@
                       <a:pPr algn="ctr"/>
                       <a:r>
                         <a:rPr lang="en-IN" dirty="0" smtClean="0"/>
-                        <a:t>Retail vs Average Retail</a:t>
+                        <a:t>Retail Price </a:t>
+                      </a:r>
+                      <a:r>
+                        <a:rPr lang="en-IN" dirty="0" smtClean="0"/>
+                        <a:t>vs Average </a:t>
+                      </a:r>
+                      <a:r>
+                        <a:rPr lang="en-IN" dirty="0" smtClean="0"/>
+                        <a:t>Retail Price</a:t>
                       </a:r>
                       <a:endParaRPr lang="en-IN" dirty="0"/>
                     </a:p>
@@ -6941,7 +6908,11 @@
                       <a:pPr algn="ctr"/>
                       <a:r>
                         <a:rPr lang="en-IN" dirty="0" smtClean="0"/>
-                        <a:t>Retail vs Arrival</a:t>
+                        <a:t>Retail Price </a:t>
+                      </a:r>
+                      <a:r>
+                        <a:rPr lang="en-IN" dirty="0" smtClean="0"/>
+                        <a:t>vs Arrival</a:t>
                       </a:r>
                       <a:endParaRPr lang="en-IN" dirty="0"/>
                     </a:p>
@@ -6988,7 +6959,15 @@
                       <a:pPr algn="ctr"/>
                       <a:r>
                         <a:rPr lang="en-IN" dirty="0" smtClean="0"/>
-                        <a:t>Retail vs Wholesale</a:t>
+                        <a:t>Retail Price </a:t>
+                      </a:r>
+                      <a:r>
+                        <a:rPr lang="en-IN" dirty="0" smtClean="0"/>
+                        <a:t>vs </a:t>
+                      </a:r>
+                      <a:r>
+                        <a:rPr lang="en-IN" dirty="0" smtClean="0"/>
+                        <a:t>Wholesale Price</a:t>
                       </a:r>
                       <a:endParaRPr lang="en-IN" dirty="0"/>
                     </a:p>
@@ -7035,11 +7014,15 @@
                       <a:pPr algn="ctr"/>
                       <a:r>
                         <a:rPr lang="en-IN" dirty="0" smtClean="0"/>
-                        <a:t>Wholesale</a:t>
+                        <a:t>Wholesale Price</a:t>
                       </a:r>
                       <a:r>
                         <a:rPr lang="en-IN" baseline="0" dirty="0" smtClean="0"/>
-                        <a:t> vs Arrival</a:t>
+                        <a:t> </a:t>
+                      </a:r>
+                      <a:r>
+                        <a:rPr lang="en-IN" baseline="0" dirty="0" smtClean="0"/>
+                        <a:t>vs Arrival</a:t>
                       </a:r>
                       <a:endParaRPr lang="en-IN" dirty="0"/>
                     </a:p>
@@ -7090,7 +7073,7 @@
         <p:spPr>
           <a:xfrm>
             <a:off x="838200" y="5370490"/>
-            <a:ext cx="7342138" cy="923330"/>
+            <a:ext cx="7859909" cy="923330"/>
           </a:xfrm>
           <a:prstGeom prst="rect">
             <a:avLst/>
@@ -7109,7 +7092,15 @@
             </a:pPr>
             <a:r>
               <a:rPr lang="en-IN" dirty="0" smtClean="0"/>
-              <a:t>Low anomalies reported for Retail vs Average =&gt; Centres move in tandem</a:t>
+              <a:t>Low anomalies reported for </a:t>
+            </a:r>
+            <a:r>
+              <a:rPr lang="en-IN" dirty="0" smtClean="0"/>
+              <a:t>Retail Price </a:t>
+            </a:r>
+            <a:r>
+              <a:rPr lang="en-IN" dirty="0" smtClean="0"/>
+              <a:t>vs Average =&gt; Centres move in tandem</a:t>
             </a:r>
           </a:p>
           <a:p>
@@ -7119,7 +7110,23 @@
             </a:pPr>
             <a:r>
               <a:rPr lang="en-IN" dirty="0" smtClean="0"/>
-              <a:t>Low Retail vs Wholesale =&gt; Retail moves in sync with wholesale</a:t>
+              <a:t>Low </a:t>
+            </a:r>
+            <a:r>
+              <a:rPr lang="en-IN" dirty="0" smtClean="0"/>
+              <a:t>Retail Price </a:t>
+            </a:r>
+            <a:r>
+              <a:rPr lang="en-IN" dirty="0" smtClean="0"/>
+              <a:t>vs Wholesale </a:t>
+            </a:r>
+            <a:r>
+              <a:rPr lang="en-IN" dirty="0" smtClean="0"/>
+              <a:t>Price =&gt; </a:t>
+            </a:r>
+            <a:r>
+              <a:rPr lang="en-IN" dirty="0" smtClean="0"/>
+              <a:t>Retail moves in sync with wholesale</a:t>
             </a:r>
           </a:p>
           <a:p>
@@ -7129,11 +7136,7 @@
             </a:pPr>
             <a:r>
               <a:rPr lang="en-IN" dirty="0" smtClean="0"/>
-              <a:t>System performs better </a:t>
-            </a:r>
-            <a:r>
-              <a:rPr lang="en-IN" smtClean="0"/>
-              <a:t>with arrival</a:t>
+              <a:t>System performs better with arrival</a:t>
             </a:r>
             <a:endParaRPr lang="en-IN" dirty="0"/>
           </a:p>
@@ -7532,14 +7535,14 @@
             <p:ph idx="1"/>
             <p:extLst>
               <p:ext uri="{D42A27DB-BD31-4B8C-83A1-F6EECF244321}">
-                <p14:modId xmlns:p14="http://schemas.microsoft.com/office/powerpoint/2010/main" val="1747472725"/>
+                <p14:modId xmlns:p14="http://schemas.microsoft.com/office/powerpoint/2010/main" val="767099099"/>
               </p:ext>
             </p:extLst>
           </p:nvPr>
         </p:nvGraphicFramePr>
         <p:xfrm>
-          <a:off x="838200" y="1825625"/>
-          <a:ext cx="5257800" cy="3479800"/>
+          <a:off x="807720" y="1557383"/>
+          <a:ext cx="5257800" cy="4023360"/>
         </p:xfrm>
         <a:graphic>
           <a:graphicData uri="http://schemas.openxmlformats.org/drawingml/2006/table">
@@ -7621,7 +7624,7 @@
                       <a:pPr algn="ctr"/>
                       <a:r>
                         <a:rPr lang="en-IN" dirty="0" smtClean="0"/>
-                        <a:t>Retail vs Average Retail</a:t>
+                        <a:t>Retail Price vs Average Retail Price</a:t>
                       </a:r>
                       <a:endParaRPr lang="en-IN" dirty="0"/>
                     </a:p>
@@ -7668,7 +7671,7 @@
                       <a:pPr algn="ctr"/>
                       <a:r>
                         <a:rPr lang="en-IN" dirty="0" smtClean="0"/>
-                        <a:t>Retail vs Arrival</a:t>
+                        <a:t>Retail Price vs Arrival</a:t>
                       </a:r>
                       <a:endParaRPr lang="en-IN" dirty="0"/>
                     </a:p>
@@ -7715,7 +7718,7 @@
                       <a:pPr algn="ctr"/>
                       <a:r>
                         <a:rPr lang="en-IN" dirty="0" smtClean="0"/>
-                        <a:t>Retail vs Wholesale</a:t>
+                        <a:t>Retail Price vs Wholesale Price</a:t>
                       </a:r>
                       <a:endParaRPr lang="en-IN" dirty="0"/>
                     </a:p>
@@ -7762,7 +7765,7 @@
                       <a:pPr algn="ctr"/>
                       <a:r>
                         <a:rPr lang="en-IN" dirty="0" smtClean="0"/>
-                        <a:t>Wholesale</a:t>
+                        <a:t>Wholesale Price</a:t>
                       </a:r>
                       <a:r>
                         <a:rPr lang="en-IN" baseline="0" dirty="0" smtClean="0"/>
@@ -7815,7 +7818,7 @@
           <p:nvPr>
             <p:extLst>
               <p:ext uri="{D42A27DB-BD31-4B8C-83A1-F6EECF244321}">
-                <p14:modId xmlns:p14="http://schemas.microsoft.com/office/powerpoint/2010/main" val="2094223534"/>
+                <p14:modId xmlns:p14="http://schemas.microsoft.com/office/powerpoint/2010/main" val="2250645993"/>
               </p:ext>
             </p:extLst>
           </p:nvPr>
@@ -8327,6 +8330,52 @@
           </a:p>
         </p:txBody>
       </p:sp>
+      <p:sp>
+        <p:nvSpPr>
+          <p:cNvPr id="3" name="Oval 2"/>
+          <p:cNvSpPr/>
+          <p:nvPr/>
+        </p:nvSpPr>
+        <p:spPr>
+          <a:xfrm>
+            <a:off x="6585995" y="4398380"/>
+            <a:ext cx="1932972" cy="405114"/>
+          </a:xfrm>
+          <a:prstGeom prst="ellipse">
+            <a:avLst/>
+          </a:prstGeom>
+          <a:noFill/>
+          <a:ln w="38100">
+            <a:solidFill>
+              <a:srgbClr val="FF0000"/>
+            </a:solidFill>
+          </a:ln>
+        </p:spPr>
+        <p:style>
+          <a:lnRef idx="2">
+            <a:schemeClr val="accent1">
+              <a:shade val="50000"/>
+            </a:schemeClr>
+          </a:lnRef>
+          <a:fillRef idx="1">
+            <a:schemeClr val="accent1"/>
+          </a:fillRef>
+          <a:effectRef idx="0">
+            <a:schemeClr val="accent1"/>
+          </a:effectRef>
+          <a:fontRef idx="minor">
+            <a:schemeClr val="lt1"/>
+          </a:fontRef>
+        </p:style>
+        <p:txBody>
+          <a:bodyPr rtlCol="0" anchor="ctr"/>
+          <a:lstStyle/>
+          <a:p>
+            <a:pPr algn="ctr"/>
+            <a:endParaRPr lang="en-IN"/>
+          </a:p>
+        </p:txBody>
+      </p:sp>
     </p:spTree>
     <p:extLst>
       <p:ext uri="{BB962C8B-B14F-4D97-AF65-F5344CB8AC3E}">
@@ -8462,6 +8511,51 @@
                       </p:childTnLst>
                     </p:cTn>
                   </p:par>
+                  <p:par>
+                    <p:cTn id="13" fill="hold">
+                      <p:stCondLst>
+                        <p:cond delay="indefinite"/>
+                      </p:stCondLst>
+                      <p:childTnLst>
+                        <p:par>
+                          <p:cTn id="14" fill="hold">
+                            <p:stCondLst>
+                              <p:cond delay="0"/>
+                            </p:stCondLst>
+                            <p:childTnLst>
+                              <p:par>
+                                <p:cTn id="15" presetID="1" presetClass="entr" presetSubtype="0" fill="hold" grpId="0" nodeType="clickEffect">
+                                  <p:stCondLst>
+                                    <p:cond delay="0"/>
+                                  </p:stCondLst>
+                                  <p:childTnLst>
+                                    <p:set>
+                                      <p:cBhvr>
+                                        <p:cTn id="16" dur="1" fill="hold">
+                                          <p:stCondLst>
+                                            <p:cond delay="0"/>
+                                          </p:stCondLst>
+                                        </p:cTn>
+                                        <p:tgtEl>
+                                          <p:spTgt spid="3"/>
+                                        </p:tgtEl>
+                                        <p:attrNameLst>
+                                          <p:attrName>style.visibility</p:attrName>
+                                        </p:attrNameLst>
+                                      </p:cBhvr>
+                                      <p:to>
+                                        <p:strVal val="visible"/>
+                                      </p:to>
+                                    </p:set>
+                                  </p:childTnLst>
+                                </p:cTn>
+                              </p:par>
+                            </p:childTnLst>
+                          </p:cTn>
+                        </p:par>
+                      </p:childTnLst>
+                    </p:cTn>
+                  </p:par>
                 </p:childTnLst>
               </p:cTn>
               <p:prevCondLst>
@@ -8483,6 +8577,9 @@
         </p:cTn>
       </p:par>
     </p:tnLst>
+    <p:bldLst>
+      <p:bldP spid="3" grpId="0" animBg="1"/>
+    </p:bldLst>
   </p:timing>
 </p:sld>
 </file>
@@ -9619,13 +9716,8 @@
             <a:pPr lvl="1"/>
             <a:r>
               <a:rPr lang="en-IN" dirty="0" smtClean="0"/>
-              <a:t>Window </a:t>
-            </a:r>
-            <a:r>
-              <a:rPr lang="en-IN" dirty="0" smtClean="0"/>
-              <a:t>Size</a:t>
-            </a:r>
-            <a:endParaRPr lang="en-IN" dirty="0" smtClean="0"/>
+              <a:t>Window Size</a:t>
+            </a:r>
           </a:p>
         </p:txBody>
       </p:sp>
@@ -9941,7 +10033,6 @@
               <a:rPr lang="en-IN" dirty="0"/>
               <a:t>4 as Slope Based Window</a:t>
             </a:r>
-            <a:endParaRPr lang="en-IN" dirty="0"/>
           </a:p>
         </p:txBody>
       </p:sp>
@@ -9954,7 +10045,7 @@
         <p:spPr>
           <a:xfrm>
             <a:off x="7323057" y="3709116"/>
-            <a:ext cx="2582823" cy="1200329"/>
+            <a:ext cx="3565463" cy="1200329"/>
           </a:xfrm>
           <a:prstGeom prst="rect">
             <a:avLst/>
@@ -9972,13 +10063,22 @@
               <a:t>1-Retail </a:t>
             </a:r>
             <a:r>
+              <a:rPr lang="en-IN" dirty="0" smtClean="0"/>
+              <a:t>Price vs </a:t>
+            </a:r>
+            <a:r>
               <a:rPr lang="en-IN" dirty="0"/>
-              <a:t>vs Average </a:t>
+              <a:t>Average </a:t>
             </a:r>
             <a:r>
               <a:rPr lang="en-IN" dirty="0" smtClean="0"/>
               <a:t>Retail </a:t>
             </a:r>
+            <a:r>
+              <a:rPr lang="en-IN" dirty="0" smtClean="0"/>
+              <a:t>Price</a:t>
+            </a:r>
+            <a:endParaRPr lang="en-IN" dirty="0" smtClean="0"/>
           </a:p>
           <a:p>
             <a:r>
@@ -9986,7 +10086,15 @@
               <a:t>2-Retail </a:t>
             </a:r>
             <a:r>
-              <a:rPr lang="en-IN" dirty="0"/>
+              <a:rPr lang="en-IN" dirty="0" smtClean="0"/>
+              <a:t>Pric</a:t>
+            </a:r>
+            <a:r>
+              <a:rPr lang="en-IN" dirty="0" smtClean="0"/>
+              <a:t>e </a:t>
+            </a:r>
+            <a:r>
+              <a:rPr lang="en-IN" dirty="0" smtClean="0"/>
               <a:t>vs </a:t>
             </a:r>
             <a:r>
@@ -10001,20 +10109,23 @@
             </a:r>
             <a:r>
               <a:rPr lang="en-IN" dirty="0"/>
-              <a:t>vs </a:t>
-            </a:r>
-            <a:r>
-              <a:rPr lang="en-IN" dirty="0" smtClean="0"/>
-              <a:t>Wholesale</a:t>
+              <a:t>Price vs Wholesale Price </a:t>
             </a:r>
             <a:endParaRPr lang="en-IN" dirty="0"/>
           </a:p>
           <a:p>
             <a:r>
               <a:rPr lang="en-IN" dirty="0"/>
-              <a:t>4-Wholesale vs Arrival</a:t>
-            </a:r>
-            <a:endParaRPr lang="en-IN" dirty="0"/>
+              <a:t>4-Wholesale </a:t>
+            </a:r>
+            <a:r>
+              <a:rPr lang="en-IN" dirty="0"/>
+              <a:t>Price vs </a:t>
+            </a:r>
+            <a:r>
+              <a:rPr lang="en-IN" dirty="0"/>
+              <a:t>Arrival</a:t>
+            </a:r>
           </a:p>
         </p:txBody>
       </p:sp>
@@ -10619,7 +10730,7 @@
             <p:ph idx="1"/>
             <p:extLst>
               <p:ext uri="{D42A27DB-BD31-4B8C-83A1-F6EECF244321}">
-                <p14:modId xmlns:p14="http://schemas.microsoft.com/office/powerpoint/2010/main" val="2808779867"/>
+                <p14:modId xmlns:p14="http://schemas.microsoft.com/office/powerpoint/2010/main" val="1167067478"/>
               </p:ext>
             </p:extLst>
           </p:nvPr>
@@ -10649,7 +10760,14 @@
                       <a:pPr algn="ctr"/>
                       <a:r>
                         <a:rPr lang="en-IN" dirty="0" smtClean="0"/>
-                        <a:t>Retail\Wholesale</a:t>
+                        <a:t>Retail Price</a:t>
+                      </a:r>
+                    </a:p>
+                    <a:p>
+                      <a:pPr algn="ctr"/>
+                      <a:r>
+                        <a:rPr lang="en-IN" dirty="0" smtClean="0"/>
+                        <a:t>\Wholesale Price</a:t>
                       </a:r>
                       <a:endParaRPr lang="en-IN" dirty="0"/>
                     </a:p>
@@ -10948,7 +11066,7 @@
           <p:nvPr>
             <p:extLst>
               <p:ext uri="{D42A27DB-BD31-4B8C-83A1-F6EECF244321}">
-                <p14:modId xmlns:p14="http://schemas.microsoft.com/office/powerpoint/2010/main" val="1376114052"/>
+                <p14:modId xmlns:p14="http://schemas.microsoft.com/office/powerpoint/2010/main" val="1804080953"/>
               </p:ext>
             </p:extLst>
           </p:nvPr>
@@ -10978,7 +11096,7 @@
                       <a:pPr algn="ctr"/>
                       <a:r>
                         <a:rPr lang="en-IN" dirty="0" smtClean="0"/>
-                        <a:t>Wholesale\Arrival</a:t>
+                        <a:t>Wholesale Price\Arrival</a:t>
                       </a:r>
                       <a:endParaRPr lang="en-IN" dirty="0"/>
                     </a:p>
@@ -11242,7 +11360,7 @@
           <p:nvPr>
             <p:extLst>
               <p:ext uri="{D42A27DB-BD31-4B8C-83A1-F6EECF244321}">
-                <p14:modId xmlns:p14="http://schemas.microsoft.com/office/powerpoint/2010/main" val="3880161370"/>
+                <p14:modId xmlns:p14="http://schemas.microsoft.com/office/powerpoint/2010/main" val="2017831185"/>
               </p:ext>
             </p:extLst>
           </p:nvPr>
@@ -11272,7 +11390,7 @@
                       <a:pPr algn="ctr"/>
                       <a:r>
                         <a:rPr lang="en-IN" dirty="0" smtClean="0"/>
-                        <a:t>Retail\Other</a:t>
+                        <a:t>Retail Price\Other</a:t>
                       </a:r>
                       <a:r>
                         <a:rPr lang="en-IN" baseline="0" dirty="0" smtClean="0"/>
@@ -11280,7 +11398,7 @@
                       </a:r>
                       <a:r>
                         <a:rPr lang="en-IN" dirty="0" smtClean="0"/>
-                        <a:t>Retail</a:t>
+                        <a:t>Retail Price</a:t>
                       </a:r>
                       <a:endParaRPr lang="en-IN" dirty="0"/>
                     </a:p>
@@ -11579,7 +11697,7 @@
           <p:nvPr>
             <p:extLst>
               <p:ext uri="{D42A27DB-BD31-4B8C-83A1-F6EECF244321}">
-                <p14:modId xmlns:p14="http://schemas.microsoft.com/office/powerpoint/2010/main" val="1680329490"/>
+                <p14:modId xmlns:p14="http://schemas.microsoft.com/office/powerpoint/2010/main" val="3288663392"/>
               </p:ext>
             </p:extLst>
           </p:nvPr>
@@ -11609,7 +11727,7 @@
                       <a:pPr algn="ctr"/>
                       <a:r>
                         <a:rPr lang="en-IN" dirty="0" smtClean="0"/>
-                        <a:t>Retail\Arrival</a:t>
+                        <a:t>Retail Price\Arrival</a:t>
                       </a:r>
                       <a:endParaRPr lang="en-IN" dirty="0"/>
                     </a:p>
@@ -12431,7 +12549,7 @@
         <p:spPr>
           <a:xfrm>
             <a:off x="8937938" y="1893194"/>
-            <a:ext cx="2640169" cy="2585323"/>
+            <a:ext cx="2640169" cy="2862322"/>
           </a:xfrm>
           <a:prstGeom prst="rect">
             <a:avLst/>
@@ -12476,7 +12594,15 @@
             </a:pPr>
             <a:r>
               <a:rPr lang="en-IN" dirty="0" smtClean="0"/>
-              <a:t>Retail continued to show increase despite decrease in arrival </a:t>
+              <a:t>Retail </a:t>
+            </a:r>
+            <a:r>
+              <a:rPr lang="en-IN" dirty="0" smtClean="0"/>
+              <a:t>price continued </a:t>
+            </a:r>
+            <a:r>
+              <a:rPr lang="en-IN" dirty="0" smtClean="0"/>
+              <a:t>to show increase despite decrease in arrival </a:t>
             </a:r>
             <a:endParaRPr lang="en-IN" dirty="0"/>
           </a:p>
@@ -12634,7 +12760,11 @@
             </a:pPr>
             <a:r>
               <a:rPr lang="en-IN" dirty="0" smtClean="0"/>
-              <a:t>The rate at which retail prices raised was not seen in case of wholesale</a:t>
+              <a:t>The rate at which retail prices raised was not seen in case of </a:t>
+            </a:r>
+            <a:r>
+              <a:rPr lang="en-IN" dirty="0" smtClean="0"/>
+              <a:t>wholesale price</a:t>
             </a:r>
             <a:endParaRPr lang="en-IN" dirty="0"/>
           </a:p>

</xml_diff>

<commit_message>
some changes in presentation
</commit_message>
<xml_diff>
--- a/thesisPresentation/Thesis - Updated.pptx
+++ b/thesisPresentation/Thesis - Updated.pptx
@@ -8738,6 +8738,52 @@
           </a:p>
         </p:txBody>
       </p:sp>
+      <p:sp>
+        <p:nvSpPr>
+          <p:cNvPr id="4" name="Oval 3"/>
+          <p:cNvSpPr/>
+          <p:nvPr/>
+        </p:nvSpPr>
+        <p:spPr>
+          <a:xfrm>
+            <a:off x="5975797" y="5035640"/>
+            <a:ext cx="2439765" cy="373487"/>
+          </a:xfrm>
+          <a:prstGeom prst="ellipse">
+            <a:avLst/>
+          </a:prstGeom>
+          <a:noFill/>
+          <a:ln w="57150">
+            <a:solidFill>
+              <a:srgbClr val="FF0000"/>
+            </a:solidFill>
+          </a:ln>
+        </p:spPr>
+        <p:style>
+          <a:lnRef idx="2">
+            <a:schemeClr val="accent1">
+              <a:shade val="50000"/>
+            </a:schemeClr>
+          </a:lnRef>
+          <a:fillRef idx="1">
+            <a:schemeClr val="accent1"/>
+          </a:fillRef>
+          <a:effectRef idx="0">
+            <a:schemeClr val="accent1"/>
+          </a:effectRef>
+          <a:fontRef idx="minor">
+            <a:schemeClr val="lt1"/>
+          </a:fontRef>
+        </p:style>
+        <p:txBody>
+          <a:bodyPr rtlCol="0" anchor="ctr"/>
+          <a:lstStyle/>
+          <a:p>
+            <a:pPr algn="ctr"/>
+            <a:endParaRPr lang="en-IN"/>
+          </a:p>
+        </p:txBody>
+      </p:sp>
     </p:spTree>
     <p:extLst>
       <p:ext uri="{BB962C8B-B14F-4D97-AF65-F5344CB8AC3E}">
@@ -8846,6 +8892,51 @@
                       </p:childTnLst>
                     </p:cTn>
                   </p:par>
+                  <p:par>
+                    <p:cTn id="11" fill="hold">
+                      <p:stCondLst>
+                        <p:cond delay="indefinite"/>
+                      </p:stCondLst>
+                      <p:childTnLst>
+                        <p:par>
+                          <p:cTn id="12" fill="hold">
+                            <p:stCondLst>
+                              <p:cond delay="0"/>
+                            </p:stCondLst>
+                            <p:childTnLst>
+                              <p:par>
+                                <p:cTn id="13" presetID="1" presetClass="entr" presetSubtype="0" fill="hold" grpId="0" nodeType="clickEffect">
+                                  <p:stCondLst>
+                                    <p:cond delay="0"/>
+                                  </p:stCondLst>
+                                  <p:childTnLst>
+                                    <p:set>
+                                      <p:cBhvr>
+                                        <p:cTn id="14" dur="1" fill="hold">
+                                          <p:stCondLst>
+                                            <p:cond delay="0"/>
+                                          </p:stCondLst>
+                                        </p:cTn>
+                                        <p:tgtEl>
+                                          <p:spTgt spid="4"/>
+                                        </p:tgtEl>
+                                        <p:attrNameLst>
+                                          <p:attrName>style.visibility</p:attrName>
+                                        </p:attrNameLst>
+                                      </p:cBhvr>
+                                      <p:to>
+                                        <p:strVal val="visible"/>
+                                      </p:to>
+                                    </p:set>
+                                  </p:childTnLst>
+                                </p:cTn>
+                              </p:par>
+                            </p:childTnLst>
+                          </p:cTn>
+                        </p:par>
+                      </p:childTnLst>
+                    </p:cTn>
+                  </p:par>
                 </p:childTnLst>
               </p:cTn>
               <p:prevCondLst>
@@ -8867,6 +8958,9 @@
         </p:cTn>
       </p:par>
     </p:tnLst>
+    <p:bldLst>
+      <p:bldP spid="4" grpId="0" animBg="1"/>
+    </p:bldLst>
   </p:timing>
 </p:sld>
 </file>

</xml_diff>